<commit_message>
add week 9, 10
</commit_message>
<xml_diff>
--- a/slides/Python_Workshop_9.pptx
+++ b/slides/Python_Workshop_9.pptx
@@ -3795,8 +3795,8 @@
         </p:blipFill>
         <p:spPr>
           <a:xfrm>
-            <a:off x="1480493" y="1261760"/>
-            <a:ext cx="9231013" cy="4334480"/>
+            <a:off x="59614" y="594577"/>
+            <a:ext cx="12072771" cy="5668845"/>
           </a:xfrm>
           <a:prstGeom prst="rect">
             <a:avLst/>
@@ -4523,8 +4523,8 @@
         </p:nvSpPr>
         <p:spPr>
           <a:xfrm>
-            <a:off x="1002323" y="2127739"/>
-            <a:ext cx="9451731" cy="3416320"/>
+            <a:off x="1370134" y="1689994"/>
+            <a:ext cx="9451731" cy="3970318"/>
           </a:xfrm>
           <a:prstGeom prst="rect">
             <a:avLst/>
@@ -4633,14 +4633,35 @@
           </a:p>
           <a:p>
             <a:pPr marL="742950" indent="-742950">
+              <a:buFontTx/>
               <a:buAutoNum type="arabicPeriod"/>
             </a:pPr>
             <a:r>
               <a:rPr lang="en-US" altLang="zh-TW" sz="3600" b="1" dirty="0">
                 <a:sym typeface="Wingdings" panose="05000000000000000000" pitchFamily="2" charset="2"/>
               </a:rPr>
-              <a:t>Append to list </a:t>
-            </a:r>
+              <a:t>Append to list (dates vs </a:t>
+            </a:r>
+            <a:r>
+              <a:rPr lang="en-US" altLang="zh-TW" sz="3600" b="1" dirty="0" err="1">
+                <a:sym typeface="Wingdings" panose="05000000000000000000" pitchFamily="2" charset="2"/>
+              </a:rPr>
+              <a:t>not_dates</a:t>
+            </a:r>
+            <a:r>
+              <a:rPr lang="en-US" altLang="zh-TW" sz="3600" b="1" dirty="0">
+                <a:sym typeface="Wingdings" panose="05000000000000000000" pitchFamily="2" charset="2"/>
+              </a:rPr>
+              <a:t>)</a:t>
+            </a:r>
+          </a:p>
+          <a:p>
+            <a:pPr marL="742950" indent="-742950">
+              <a:buAutoNum type="arabicPeriod"/>
+            </a:pPr>
+            <a:endParaRPr lang="en-US" altLang="zh-TW" sz="3600" b="1" dirty="0">
+              <a:sym typeface="Wingdings" panose="05000000000000000000" pitchFamily="2" charset="2"/>
+            </a:endParaRPr>
           </a:p>
           <a:p>
             <a:pPr marL="742950" indent="-742950">
@@ -4869,7 +4890,19 @@
               <a:rPr lang="en-US" altLang="zh-TW" sz="3600" b="1" dirty="0">
                 <a:sym typeface="Wingdings" panose="05000000000000000000" pitchFamily="2" charset="2"/>
               </a:rPr>
-              <a:t>Append to list </a:t>
+              <a:t>Append to list (dates vs </a:t>
+            </a:r>
+            <a:r>
+              <a:rPr lang="en-US" altLang="zh-TW" sz="3600" b="1" dirty="0" err="1">
+                <a:sym typeface="Wingdings" panose="05000000000000000000" pitchFamily="2" charset="2"/>
+              </a:rPr>
+              <a:t>not_dates</a:t>
+            </a:r>
+            <a:r>
+              <a:rPr lang="en-US" altLang="zh-TW" sz="3600" b="1" dirty="0">
+                <a:sym typeface="Wingdings" panose="05000000000000000000" pitchFamily="2" charset="2"/>
+              </a:rPr>
+              <a:t>)</a:t>
             </a:r>
           </a:p>
           <a:p>

</xml_diff>